<commit_message>
Update DWIConverter tutorial according to Marianna's comments
</commit_message>
<xml_diff>
--- a/docs/tutorials/DWIConverterTutorial.pptx
+++ b/docs/tutorials/DWIConverterTutorial.pptx
@@ -119,6 +119,22 @@
       </a:defRPr>
     </a:lvl9pPr>
   </p:defaultTextStyle>
+  <p:extLst>
+    <p:ext uri="{EFAFB233-063F-42B5-8137-9DF3F51BA10A}">
+      <p15:sldGuideLst xmlns:p15="http://schemas.microsoft.com/office/powerpoint/2012/main">
+        <p15:guide id="1" orient="horz" pos="2160">
+          <p15:clr>
+            <a:srgbClr val="A4A3A4"/>
+          </p15:clr>
+        </p15:guide>
+        <p15:guide id="2" pos="2880">
+          <p15:clr>
+            <a:srgbClr val="A4A3A4"/>
+          </p15:clr>
+        </p15:guide>
+      </p15:sldGuideLst>
+    </p:ext>
+  </p:extLst>
 </p:presentation>
 </file>
 
@@ -204,7 +220,7 @@
           <a:p>
             <a:fld id="{F4B8B94D-C769-2B4B-A399-D1FF296C7A5F}" type="datetimeFigureOut">
               <a:rPr lang="en-US" smtClean="0"/>
-              <a:t>12/1/16</a:t>
+              <a:t>12/8/16</a:t>
             </a:fld>
             <a:endParaRPr lang="en-US"/>
           </a:p>
@@ -370,7 +386,7 @@
           <a:p>
             <a:fld id="{F63F107A-9B37-724A-A1C5-01D855C42299}" type="datetimeFigureOut">
               <a:rPr lang="en-US" smtClean="0"/>
-              <a:t>12/1/16</a:t>
+              <a:t>12/8/16</a:t>
             </a:fld>
             <a:endParaRPr lang="en-US"/>
           </a:p>
@@ -820,7 +836,7 @@
           <a:p>
             <a:fld id="{33EB42FB-FDD6-EC4E-ADE6-A7FBA11CFC86}" type="datetime1">
               <a:rPr lang="en-US" smtClean="0"/>
-              <a:t>12/1/16</a:t>
+              <a:t>12/8/16</a:t>
             </a:fld>
             <a:endParaRPr lang="en-US"/>
           </a:p>
@@ -990,7 +1006,7 @@
           <a:p>
             <a:fld id="{E8BFADBC-1806-6E41-BBD0-19139F5412DE}" type="datetime1">
               <a:rPr lang="en-US" smtClean="0"/>
-              <a:t>12/1/16</a:t>
+              <a:t>12/8/16</a:t>
             </a:fld>
             <a:endParaRPr lang="en-US"/>
           </a:p>
@@ -1170,7 +1186,7 @@
           <a:p>
             <a:fld id="{43541DFC-9E31-6F4C-8F65-87FA09EB0200}" type="datetime1">
               <a:rPr lang="en-US" smtClean="0"/>
-              <a:t>12/1/16</a:t>
+              <a:t>12/8/16</a:t>
             </a:fld>
             <a:endParaRPr lang="en-US"/>
           </a:p>
@@ -1340,7 +1356,7 @@
           <a:p>
             <a:fld id="{2A364378-AC19-AA4F-8C10-AB08DF7C6850}" type="datetime1">
               <a:rPr lang="en-US" smtClean="0"/>
-              <a:t>12/1/16</a:t>
+              <a:t>12/8/16</a:t>
             </a:fld>
             <a:endParaRPr lang="en-US"/>
           </a:p>
@@ -1586,7 +1602,7 @@
           <a:p>
             <a:fld id="{47E74D23-0E0F-1C46-95BB-29E6D584D200}" type="datetime1">
               <a:rPr lang="en-US" smtClean="0"/>
-              <a:t>12/1/16</a:t>
+              <a:t>12/8/16</a:t>
             </a:fld>
             <a:endParaRPr lang="en-US"/>
           </a:p>
@@ -1874,7 +1890,7 @@
           <a:p>
             <a:fld id="{09F6DFE6-F957-414F-8C75-03A5A6508520}" type="datetime1">
               <a:rPr lang="en-US" smtClean="0"/>
-              <a:t>12/1/16</a:t>
+              <a:t>12/8/16</a:t>
             </a:fld>
             <a:endParaRPr lang="en-US"/>
           </a:p>
@@ -2296,7 +2312,7 @@
           <a:p>
             <a:fld id="{01C3386B-09F6-4547-9E25-901B43DDD6DD}" type="datetime1">
               <a:rPr lang="en-US" smtClean="0"/>
-              <a:t>12/1/16</a:t>
+              <a:t>12/8/16</a:t>
             </a:fld>
             <a:endParaRPr lang="en-US"/>
           </a:p>
@@ -2414,7 +2430,7 @@
           <a:p>
             <a:fld id="{7AB84910-57A7-9B49-903D-255EA2ED853C}" type="datetime1">
               <a:rPr lang="en-US" smtClean="0"/>
-              <a:t>12/1/16</a:t>
+              <a:t>12/8/16</a:t>
             </a:fld>
             <a:endParaRPr lang="en-US"/>
           </a:p>
@@ -2509,7 +2525,7 @@
           <a:p>
             <a:fld id="{F75ABBBA-1D6F-C948-AA0E-B54B9F5C3179}" type="datetime1">
               <a:rPr lang="en-US" smtClean="0"/>
-              <a:t>12/1/16</a:t>
+              <a:t>12/8/16</a:t>
             </a:fld>
             <a:endParaRPr lang="en-US"/>
           </a:p>
@@ -2786,7 +2802,7 @@
           <a:p>
             <a:fld id="{FD5622A9-E5E8-6144-9B03-DB3392D1427B}" type="datetime1">
               <a:rPr lang="en-US" smtClean="0"/>
-              <a:t>12/1/16</a:t>
+              <a:t>12/8/16</a:t>
             </a:fld>
             <a:endParaRPr lang="en-US"/>
           </a:p>
@@ -3039,7 +3055,7 @@
           <a:p>
             <a:fld id="{86165B71-C680-684B-AB9C-031AF9F9FA53}" type="datetime1">
               <a:rPr lang="en-US" smtClean="0"/>
-              <a:t>12/1/16</a:t>
+              <a:t>12/8/16</a:t>
             </a:fld>
             <a:endParaRPr lang="en-US"/>
           </a:p>
@@ -3252,7 +3268,7 @@
           <a:p>
             <a:fld id="{4DCD264A-2270-FC49-89A2-6FF9B83D14E2}" type="datetime1">
               <a:rPr lang="en-US" smtClean="0"/>
-              <a:t>12/1/16</a:t>
+              <a:t>12/8/16</a:t>
             </a:fld>
             <a:endParaRPr lang="en-US"/>
           </a:p>
@@ -3690,9 +3706,280 @@
           </a:p>
         </p:txBody>
       </p:sp>
+    </p:spTree>
+    <p:extLst>
+      <p:ext uri="{BB962C8B-B14F-4D97-AF65-F5344CB8AC3E}">
+        <p14:creationId xmlns:p14="http://schemas.microsoft.com/office/powerpoint/2010/main" val="2546042292"/>
+      </p:ext>
+    </p:extLst>
+  </p:cSld>
+  <p:clrMapOvr>
+    <a:masterClrMapping/>
+  </p:clrMapOvr>
+  <p:timing>
+    <p:tnLst>
+      <p:par>
+        <p:cTn id="1" dur="indefinite" restart="never" nodeType="tmRoot"/>
+      </p:par>
+    </p:tnLst>
+  </p:timing>
+</p:sld>
+</file>
+
+<file path=ppt/slides/slide10.xml><?xml version="1.0" encoding="utf-8"?>
+<p:sld xmlns:a="http://schemas.openxmlformats.org/drawingml/2006/main" xmlns:r="http://schemas.openxmlformats.org/officeDocument/2006/relationships" xmlns:p="http://schemas.openxmlformats.org/presentationml/2006/main">
+  <p:cSld>
+    <p:spTree>
+      <p:nvGrpSpPr>
+        <p:cNvPr id="1" name=""/>
+        <p:cNvGrpSpPr/>
+        <p:nvPr/>
+      </p:nvGrpSpPr>
+      <p:grpSpPr>
+        <a:xfrm>
+          <a:off x="0" y="0"/>
+          <a:ext cx="0" cy="0"/>
+          <a:chOff x="0" y="0"/>
+          <a:chExt cx="0" cy="0"/>
+        </a:xfrm>
+      </p:grpSpPr>
+      <p:sp>
+        <p:nvSpPr>
+          <p:cNvPr id="2" name="Title 1"/>
+          <p:cNvSpPr>
+            <a:spLocks noGrp="1"/>
+          </p:cNvSpPr>
+          <p:nvPr>
+            <p:ph type="title"/>
+          </p:nvPr>
+        </p:nvSpPr>
+        <p:spPr/>
+        <p:txBody>
+          <a:bodyPr/>
+          <a:lstStyle/>
+          <a:p>
+            <a:r>
+              <a:rPr lang="en-US" dirty="0" smtClean="0">
+                <a:latin typeface="Arial"/>
+                <a:cs typeface="Arial"/>
+              </a:rPr>
+              <a:t>Acknowledgements </a:t>
+            </a:r>
+            <a:endParaRPr lang="en-US" dirty="0">
+              <a:latin typeface="Arial"/>
+              <a:cs typeface="Arial"/>
+            </a:endParaRPr>
+          </a:p>
+        </p:txBody>
+      </p:sp>
+      <p:sp>
+        <p:nvSpPr>
+          <p:cNvPr id="3" name="Content Placeholder 2"/>
+          <p:cNvSpPr>
+            <a:spLocks noGrp="1"/>
+          </p:cNvSpPr>
+          <p:nvPr>
+            <p:ph idx="1"/>
+          </p:nvPr>
+        </p:nvSpPr>
+        <p:spPr>
+          <a:xfrm>
+            <a:off x="1708266" y="1600200"/>
+            <a:ext cx="6978534" cy="4525963"/>
+          </a:xfrm>
+        </p:spPr>
+        <p:txBody>
+          <a:bodyPr>
+            <a:normAutofit lnSpcReduction="10000"/>
+          </a:bodyPr>
+          <a:lstStyle/>
+          <a:p>
+            <a:endParaRPr lang="en-US" dirty="0" smtClean="0"/>
+          </a:p>
+          <a:p>
+            <a:r>
+              <a:rPr lang="en-US" sz="1800" dirty="0" smtClean="0">
+                <a:latin typeface="Arial"/>
+                <a:cs typeface="Arial"/>
+              </a:rPr>
+              <a:t>U01CA199459, </a:t>
+            </a:r>
+            <a:r>
+              <a:rPr lang="en-US" sz="1800" dirty="0">
+                <a:latin typeface="Arial"/>
+                <a:cs typeface="Arial"/>
+              </a:rPr>
+              <a:t>Open Source Diffusion MRI Technology For Brain Cancer </a:t>
+            </a:r>
+            <a:r>
+              <a:rPr lang="en-US" sz="1800" dirty="0" smtClean="0">
+                <a:latin typeface="Arial"/>
+                <a:cs typeface="Arial"/>
+              </a:rPr>
+              <a:t>Research</a:t>
+            </a:r>
+          </a:p>
+          <a:p>
+            <a:endParaRPr lang="en-US" sz="1800" dirty="0" smtClean="0">
+              <a:latin typeface="Arial"/>
+              <a:cs typeface="Arial"/>
+            </a:endParaRPr>
+          </a:p>
+          <a:p>
+            <a:r>
+              <a:rPr lang="en-US" sz="1800" dirty="0" smtClean="0">
+                <a:latin typeface="Arial"/>
+                <a:cs typeface="Arial"/>
+              </a:rPr>
+              <a:t>National Alliance for Medical Image Computing (NA-MIC)</a:t>
+            </a:r>
+            <a:br>
+              <a:rPr lang="en-US" sz="1800" dirty="0" smtClean="0">
+                <a:latin typeface="Arial"/>
+                <a:cs typeface="Arial"/>
+              </a:rPr>
+            </a:br>
+            <a:r>
+              <a:rPr lang="en-US" sz="1800" dirty="0" err="1" smtClean="0">
+                <a:latin typeface="Arial"/>
+                <a:cs typeface="Arial"/>
+              </a:rPr>
+              <a:t>namic.org</a:t>
+            </a:r>
+            <a:endParaRPr lang="en-US" sz="1800" dirty="0" smtClean="0">
+              <a:latin typeface="Arial"/>
+              <a:cs typeface="Arial"/>
+            </a:endParaRPr>
+          </a:p>
+          <a:p>
+            <a:endParaRPr lang="en-US" sz="1800" dirty="0" smtClean="0">
+              <a:latin typeface="Arial"/>
+              <a:cs typeface="Arial"/>
+            </a:endParaRPr>
+          </a:p>
+          <a:p>
+            <a:r>
+              <a:rPr lang="en-US" sz="1800" dirty="0" smtClean="0">
+                <a:latin typeface="Arial"/>
+                <a:cs typeface="Arial"/>
+              </a:rPr>
+              <a:t>National Center for Image Guided Therapy (NCIGT)</a:t>
+            </a:r>
+            <a:br>
+              <a:rPr lang="en-US" sz="1800" dirty="0" smtClean="0">
+                <a:latin typeface="Arial"/>
+                <a:cs typeface="Arial"/>
+              </a:rPr>
+            </a:br>
+            <a:r>
+              <a:rPr lang="en-US" sz="1800" dirty="0" err="1" smtClean="0">
+                <a:latin typeface="Arial"/>
+                <a:cs typeface="Arial"/>
+              </a:rPr>
+              <a:t>ncigt.org</a:t>
+            </a:r>
+            <a:endParaRPr lang="en-US" sz="1800" dirty="0" smtClean="0">
+              <a:latin typeface="Arial"/>
+              <a:cs typeface="Arial"/>
+            </a:endParaRPr>
+          </a:p>
+          <a:p>
+            <a:endParaRPr lang="en-US" sz="1800" dirty="0" smtClean="0">
+              <a:latin typeface="Arial"/>
+              <a:cs typeface="Arial"/>
+            </a:endParaRPr>
+          </a:p>
+          <a:p>
+            <a:r>
+              <a:rPr lang="en-US" sz="1800" dirty="0" err="1" smtClean="0">
+                <a:latin typeface="Arial"/>
+                <a:cs typeface="Arial"/>
+              </a:rPr>
+              <a:t>Neuroimage</a:t>
+            </a:r>
+            <a:r>
+              <a:rPr lang="en-US" sz="1800" dirty="0" smtClean="0">
+                <a:latin typeface="Arial"/>
+                <a:cs typeface="Arial"/>
+              </a:rPr>
+              <a:t> Analysis Center</a:t>
+            </a:r>
+            <a:r>
+              <a:rPr lang="en-US" sz="1800" dirty="0">
+                <a:latin typeface="Arial"/>
+                <a:cs typeface="Arial"/>
+              </a:rPr>
+              <a:t> </a:t>
+            </a:r>
+            <a:r>
+              <a:rPr lang="en-US" sz="1800" dirty="0" smtClean="0">
+                <a:latin typeface="Arial"/>
+                <a:cs typeface="Arial"/>
+              </a:rPr>
+              <a:t>(NAC)</a:t>
+            </a:r>
+            <a:r>
+              <a:rPr lang="en-US" sz="1800" dirty="0">
+                <a:latin typeface="Arial"/>
+                <a:cs typeface="Arial"/>
+              </a:rPr>
+              <a:t/>
+            </a:r>
+            <a:br>
+              <a:rPr lang="en-US" sz="1800" dirty="0">
+                <a:latin typeface="Arial"/>
+                <a:cs typeface="Arial"/>
+              </a:rPr>
+            </a:br>
+            <a:r>
+              <a:rPr lang="en-US" sz="1800" dirty="0" err="1" smtClean="0">
+                <a:latin typeface="Arial"/>
+                <a:cs typeface="Arial"/>
+              </a:rPr>
+              <a:t>nac.spl.harvard.edu</a:t>
+            </a:r>
+            <a:endParaRPr lang="en-US" sz="1800" dirty="0" smtClean="0">
+              <a:latin typeface="Arial"/>
+              <a:cs typeface="Arial"/>
+            </a:endParaRPr>
+          </a:p>
+          <a:p>
+            <a:endParaRPr lang="en-US" sz="1800" dirty="0">
+              <a:latin typeface="Arial"/>
+              <a:cs typeface="Arial"/>
+            </a:endParaRPr>
+          </a:p>
+          <a:p>
+            <a:r>
+              <a:rPr lang="en-US" sz="1800" dirty="0" smtClean="0">
+                <a:latin typeface="Arial"/>
+                <a:cs typeface="Arial"/>
+              </a:rPr>
+              <a:t>Surgical Planning laboratory (SPL) </a:t>
+            </a:r>
+            <a:br>
+              <a:rPr lang="en-US" sz="1800" dirty="0" smtClean="0">
+                <a:latin typeface="Arial"/>
+                <a:cs typeface="Arial"/>
+              </a:rPr>
+            </a:br>
+            <a:r>
+              <a:rPr lang="en-US" sz="1800" dirty="0" err="1" smtClean="0">
+                <a:latin typeface="Arial"/>
+                <a:cs typeface="Arial"/>
+              </a:rPr>
+              <a:t>spl.harvard.edu</a:t>
+            </a:r>
+            <a:endParaRPr lang="en-US" sz="1800" dirty="0">
+              <a:latin typeface="Arial"/>
+              <a:cs typeface="Arial"/>
+            </a:endParaRPr>
+          </a:p>
+        </p:txBody>
+      </p:sp>
       <p:pic>
         <p:nvPicPr>
-          <p:cNvPr id="6" name="Picture 5"/>
+          <p:cNvPr id="5" name="Picture 4"/>
           <p:cNvPicPr>
             <a:picLocks noChangeAspect="1"/>
           </p:cNvPicPr>
@@ -3718,8 +4005,8 @@
         </p:blipFill>
         <p:spPr>
           <a:xfrm>
-            <a:off x="0" y="0"/>
-            <a:ext cx="1993900" cy="2019300"/>
+            <a:off x="861065" y="2759031"/>
+            <a:ext cx="677174" cy="685800"/>
           </a:xfrm>
           <a:prstGeom prst="rect">
             <a:avLst/>
@@ -3754,8 +4041,8 @@
         </p:blipFill>
         <p:spPr>
           <a:xfrm>
-            <a:off x="7620000" y="0"/>
-            <a:ext cx="1524000" cy="1803400"/>
+            <a:off x="882644" y="4448686"/>
+            <a:ext cx="579120" cy="685292"/>
           </a:xfrm>
           <a:prstGeom prst="rect">
             <a:avLst/>
@@ -3790,8 +4077,8 @@
         </p:blipFill>
         <p:spPr>
           <a:xfrm>
-            <a:off x="7340600" y="5461000"/>
-            <a:ext cx="1803400" cy="1397000"/>
+            <a:off x="796244" y="3578391"/>
+            <a:ext cx="771525" cy="691515"/>
           </a:xfrm>
           <a:prstGeom prst="rect">
             <a:avLst/>
@@ -3826,205 +4113,14 @@
         </p:blipFill>
         <p:spPr>
           <a:xfrm>
-            <a:off x="0" y="5321300"/>
-            <a:ext cx="1714500" cy="1536700"/>
+            <a:off x="692743" y="5346593"/>
+            <a:ext cx="883666" cy="684530"/>
           </a:xfrm>
           <a:prstGeom prst="rect">
             <a:avLst/>
           </a:prstGeom>
         </p:spPr>
       </p:pic>
-    </p:spTree>
-    <p:extLst>
-      <p:ext uri="{BB962C8B-B14F-4D97-AF65-F5344CB8AC3E}">
-        <p14:creationId xmlns:p14="http://schemas.microsoft.com/office/powerpoint/2010/main" val="2546042292"/>
-      </p:ext>
-    </p:extLst>
-  </p:cSld>
-  <p:clrMapOvr>
-    <a:masterClrMapping/>
-  </p:clrMapOvr>
-  <p:timing>
-    <p:tnLst>
-      <p:par>
-        <p:cTn xmlns:p14="http://schemas.microsoft.com/office/powerpoint/2010/main" id="1" dur="indefinite" restart="never" nodeType="tmRoot"/>
-      </p:par>
-    </p:tnLst>
-  </p:timing>
-</p:sld>
-</file>
-
-<file path=ppt/slides/slide10.xml><?xml version="1.0" encoding="utf-8"?>
-<p:sld xmlns:a="http://schemas.openxmlformats.org/drawingml/2006/main" xmlns:r="http://schemas.openxmlformats.org/officeDocument/2006/relationships" xmlns:p="http://schemas.openxmlformats.org/presentationml/2006/main">
-  <p:cSld>
-    <p:spTree>
-      <p:nvGrpSpPr>
-        <p:cNvPr id="1" name=""/>
-        <p:cNvGrpSpPr/>
-        <p:nvPr/>
-      </p:nvGrpSpPr>
-      <p:grpSpPr>
-        <a:xfrm>
-          <a:off x="0" y="0"/>
-          <a:ext cx="0" cy="0"/>
-          <a:chOff x="0" y="0"/>
-          <a:chExt cx="0" cy="0"/>
-        </a:xfrm>
-      </p:grpSpPr>
-      <p:sp>
-        <p:nvSpPr>
-          <p:cNvPr id="2" name="Title 1"/>
-          <p:cNvSpPr>
-            <a:spLocks noGrp="1"/>
-          </p:cNvSpPr>
-          <p:nvPr>
-            <p:ph type="title"/>
-          </p:nvPr>
-        </p:nvSpPr>
-        <p:spPr/>
-        <p:txBody>
-          <a:bodyPr/>
-          <a:lstStyle/>
-          <a:p>
-            <a:r>
-              <a:rPr lang="en-US" dirty="0" smtClean="0">
-                <a:latin typeface="Arial"/>
-                <a:cs typeface="Arial"/>
-              </a:rPr>
-              <a:t>Acknowledgements </a:t>
-            </a:r>
-            <a:endParaRPr lang="en-US" dirty="0">
-              <a:latin typeface="Arial"/>
-              <a:cs typeface="Arial"/>
-            </a:endParaRPr>
-          </a:p>
-        </p:txBody>
-      </p:sp>
-      <p:sp>
-        <p:nvSpPr>
-          <p:cNvPr id="3" name="Content Placeholder 2"/>
-          <p:cNvSpPr>
-            <a:spLocks noGrp="1"/>
-          </p:cNvSpPr>
-          <p:nvPr>
-            <p:ph idx="1"/>
-          </p:nvPr>
-        </p:nvSpPr>
-        <p:spPr/>
-        <p:txBody>
-          <a:bodyPr/>
-          <a:lstStyle/>
-          <a:p>
-            <a:endParaRPr lang="en-US" dirty="0" smtClean="0"/>
-          </a:p>
-          <a:p>
-            <a:r>
-              <a:rPr lang="en-US" sz="2400" dirty="0" smtClean="0">
-                <a:latin typeface="Arial"/>
-                <a:cs typeface="Arial"/>
-              </a:rPr>
-              <a:t>U01CA199459, </a:t>
-            </a:r>
-            <a:r>
-              <a:rPr lang="en-US" sz="2400" dirty="0">
-                <a:latin typeface="Arial"/>
-                <a:cs typeface="Arial"/>
-              </a:rPr>
-              <a:t>Open Source Diffusion MRI Technology For Brain Cancer Research</a:t>
-            </a:r>
-          </a:p>
-          <a:p>
-            <a:endParaRPr lang="en-US" sz="2400" dirty="0" smtClean="0">
-              <a:latin typeface="Arial"/>
-              <a:cs typeface="Arial"/>
-            </a:endParaRPr>
-          </a:p>
-          <a:p>
-            <a:r>
-              <a:rPr lang="en-US" sz="2400" dirty="0" smtClean="0">
-                <a:latin typeface="Arial"/>
-                <a:cs typeface="Arial"/>
-              </a:rPr>
-              <a:t>P41EB015898</a:t>
-            </a:r>
-            <a:r>
-              <a:rPr lang="en-US" sz="2400" dirty="0">
-                <a:latin typeface="Arial"/>
-                <a:cs typeface="Arial"/>
-              </a:rPr>
-              <a:t>,  </a:t>
-            </a:r>
-            <a:r>
-              <a:rPr lang="en-US" sz="2400" dirty="0" smtClean="0">
-                <a:latin typeface="Arial"/>
-                <a:cs typeface="Arial"/>
-              </a:rPr>
-              <a:t>National Center for Image Guided Therapy (NCIGT)</a:t>
-            </a:r>
-            <a:endParaRPr lang="en-US" sz="2400" dirty="0">
-              <a:latin typeface="Arial"/>
-              <a:cs typeface="Arial"/>
-            </a:endParaRPr>
-          </a:p>
-          <a:p>
-            <a:pPr marL="0" indent="0">
-              <a:buNone/>
-            </a:pPr>
-            <a:endParaRPr lang="en-US" sz="2400" dirty="0" smtClean="0">
-              <a:latin typeface="Arial"/>
-              <a:cs typeface="Arial"/>
-            </a:endParaRPr>
-          </a:p>
-          <a:p>
-            <a:r>
-              <a:rPr lang="en-US" sz="2400" dirty="0" smtClean="0">
-                <a:latin typeface="Arial"/>
-                <a:cs typeface="Arial"/>
-              </a:rPr>
-              <a:t>P41EB015902</a:t>
-            </a:r>
-            <a:r>
-              <a:rPr lang="en-US" sz="2400" dirty="0">
-                <a:latin typeface="Arial"/>
-                <a:cs typeface="Arial"/>
-              </a:rPr>
-              <a:t>, </a:t>
-            </a:r>
-            <a:r>
-              <a:rPr lang="en-US" sz="2400" dirty="0" err="1" smtClean="0">
-                <a:latin typeface="Arial"/>
-                <a:cs typeface="Arial"/>
-              </a:rPr>
-              <a:t>Neuroimage</a:t>
-            </a:r>
-            <a:r>
-              <a:rPr lang="en-US" sz="2400" dirty="0" smtClean="0">
-                <a:latin typeface="Arial"/>
-                <a:cs typeface="Arial"/>
-              </a:rPr>
-              <a:t> Analysis Center</a:t>
-            </a:r>
-            <a:r>
-              <a:rPr lang="en-US" sz="2400" dirty="0">
-                <a:latin typeface="Arial"/>
-                <a:cs typeface="Arial"/>
-              </a:rPr>
-              <a:t> </a:t>
-            </a:r>
-            <a:r>
-              <a:rPr lang="en-US" sz="2400" dirty="0" smtClean="0">
-                <a:latin typeface="Arial"/>
-                <a:cs typeface="Arial"/>
-              </a:rPr>
-              <a:t>(NAC)</a:t>
-            </a:r>
-            <a:endParaRPr lang="en-US" sz="2400" dirty="0">
-              <a:latin typeface="Arial"/>
-              <a:cs typeface="Arial"/>
-            </a:endParaRPr>
-          </a:p>
-        </p:txBody>
-      </p:sp>
     </p:spTree>
     <p:extLst>
       <p:ext uri="{BB962C8B-B14F-4D97-AF65-F5344CB8AC3E}">
@@ -4038,7 +4134,7 @@
   <p:timing>
     <p:tnLst>
       <p:par>
-        <p:cTn xmlns:p14="http://schemas.microsoft.com/office/powerpoint/2010/main" id="1" dur="indefinite" restart="never" nodeType="tmRoot"/>
+        <p:cTn id="1" dur="indefinite" restart="never" nodeType="tmRoot"/>
       </p:par>
     </p:tnLst>
   </p:timing>
@@ -4062,29 +4158,6 @@
           <a:chExt cx="0" cy="0"/>
         </a:xfrm>
       </p:grpSpPr>
-      <p:pic>
-        <p:nvPicPr>
-          <p:cNvPr id="7" name="Picture 6"/>
-          <p:cNvPicPr>
-            <a:picLocks noChangeAspect="1"/>
-          </p:cNvPicPr>
-          <p:nvPr/>
-        </p:nvPicPr>
-        <p:blipFill rotWithShape="1">
-          <a:blip r:embed="rId2"/>
-          <a:srcRect t="2762"/>
-          <a:stretch/>
-        </p:blipFill>
-        <p:spPr>
-          <a:xfrm>
-            <a:off x="0" y="1307782"/>
-            <a:ext cx="9144000" cy="5557167"/>
-          </a:xfrm>
-          <a:prstGeom prst="rect">
-            <a:avLst/>
-          </a:prstGeom>
-        </p:spPr>
-      </p:pic>
       <p:sp>
         <p:nvSpPr>
           <p:cNvPr id="2" name="Title 1"/>
@@ -4135,7 +4208,7 @@
           <p:nvPr/>
         </p:nvPicPr>
         <p:blipFill>
-          <a:blip r:embed="rId3"/>
+          <a:blip r:embed="rId2"/>
           <a:stretch>
             <a:fillRect/>
           </a:stretch>
@@ -4144,6 +4217,29 @@
           <a:xfrm>
             <a:off x="0" y="0"/>
             <a:ext cx="1020706" cy="1013763"/>
+          </a:xfrm>
+          <a:prstGeom prst="rect">
+            <a:avLst/>
+          </a:prstGeom>
+        </p:spPr>
+      </p:pic>
+      <p:pic>
+        <p:nvPicPr>
+          <p:cNvPr id="4" name="Picture 3"/>
+          <p:cNvPicPr>
+            <a:picLocks noChangeAspect="1"/>
+          </p:cNvPicPr>
+          <p:nvPr/>
+        </p:nvPicPr>
+        <p:blipFill rotWithShape="1">
+          <a:blip r:embed="rId3"/>
+          <a:srcRect t="1710"/>
+          <a:stretch/>
+        </p:blipFill>
+        <p:spPr>
+          <a:xfrm>
+            <a:off x="0" y="1797978"/>
+            <a:ext cx="9144000" cy="5055522"/>
           </a:xfrm>
           <a:prstGeom prst="rect">
             <a:avLst/>
@@ -4163,7 +4259,7 @@
   <p:timing>
     <p:tnLst>
       <p:par>
-        <p:cTn xmlns:p14="http://schemas.microsoft.com/office/powerpoint/2010/main" id="1" dur="indefinite" restart="never" nodeType="tmRoot"/>
+        <p:cTn id="1" dur="indefinite" restart="never" nodeType="tmRoot"/>
       </p:par>
     </p:tnLst>
   </p:timing>
@@ -4171,6 +4267,416 @@
 </file>
 
 <file path=ppt/slides/slide3.xml><?xml version="1.0" encoding="utf-8"?>
+<p:sld xmlns:a="http://schemas.openxmlformats.org/drawingml/2006/main" xmlns:r="http://schemas.openxmlformats.org/officeDocument/2006/relationships" xmlns:p="http://schemas.openxmlformats.org/presentationml/2006/main">
+  <p:cSld>
+    <p:spTree>
+      <p:nvGrpSpPr>
+        <p:cNvPr id="1" name=""/>
+        <p:cNvGrpSpPr/>
+        <p:nvPr/>
+      </p:nvGrpSpPr>
+      <p:grpSpPr>
+        <a:xfrm>
+          <a:off x="0" y="0"/>
+          <a:ext cx="0" cy="0"/>
+          <a:chOff x="0" y="0"/>
+          <a:chExt cx="0" cy="0"/>
+        </a:xfrm>
+      </p:grpSpPr>
+      <p:pic>
+        <p:nvPicPr>
+          <p:cNvPr id="10" name="Picture 9"/>
+          <p:cNvPicPr>
+            <a:picLocks noChangeAspect="1"/>
+          </p:cNvPicPr>
+          <p:nvPr/>
+        </p:nvPicPr>
+        <p:blipFill rotWithShape="1">
+          <a:blip r:embed="rId2"/>
+          <a:srcRect t="1511"/>
+          <a:stretch/>
+        </p:blipFill>
+        <p:spPr>
+          <a:xfrm>
+            <a:off x="0" y="1787702"/>
+            <a:ext cx="9144000" cy="5065797"/>
+          </a:xfrm>
+          <a:prstGeom prst="rect">
+            <a:avLst/>
+          </a:prstGeom>
+        </p:spPr>
+      </p:pic>
+      <p:sp>
+        <p:nvSpPr>
+          <p:cNvPr id="2" name="Title 1"/>
+          <p:cNvSpPr>
+            <a:spLocks noGrp="1"/>
+          </p:cNvSpPr>
+          <p:nvPr>
+            <p:ph type="title"/>
+          </p:nvPr>
+        </p:nvSpPr>
+        <p:spPr/>
+        <p:txBody>
+          <a:bodyPr/>
+          <a:lstStyle/>
+          <a:p>
+            <a:r>
+              <a:rPr lang="en-US" dirty="0" smtClean="0">
+                <a:latin typeface="Arial"/>
+                <a:cs typeface="Arial"/>
+              </a:rPr>
+              <a:t>DWI Converter Module</a:t>
+            </a:r>
+            <a:endParaRPr lang="en-US" dirty="0">
+              <a:latin typeface="Arial"/>
+              <a:cs typeface="Arial"/>
+            </a:endParaRPr>
+          </a:p>
+        </p:txBody>
+      </p:sp>
+      <p:cxnSp>
+        <p:nvCxnSpPr>
+          <p:cNvPr id="7" name="Straight Arrow Connector 6"/>
+          <p:cNvCxnSpPr/>
+          <p:nvPr/>
+        </p:nvCxnSpPr>
+        <p:spPr>
+          <a:xfrm flipH="1" flipV="1">
+            <a:off x="4643919" y="4243227"/>
+            <a:ext cx="1584423" cy="324700"/>
+          </a:xfrm>
+          <a:prstGeom prst="straightConnector1">
+            <a:avLst/>
+          </a:prstGeom>
+          <a:ln>
+            <a:solidFill>
+              <a:srgbClr val="FF0000"/>
+            </a:solidFill>
+            <a:tailEnd type="arrow"/>
+          </a:ln>
+        </p:spPr>
+        <p:style>
+          <a:lnRef idx="2">
+            <a:schemeClr val="accent1"/>
+          </a:lnRef>
+          <a:fillRef idx="0">
+            <a:schemeClr val="accent1"/>
+          </a:fillRef>
+          <a:effectRef idx="1">
+            <a:schemeClr val="accent1"/>
+          </a:effectRef>
+          <a:fontRef idx="minor">
+            <a:schemeClr val="tx1"/>
+          </a:fontRef>
+        </p:style>
+      </p:cxnSp>
+      <p:grpSp>
+        <p:nvGrpSpPr>
+          <p:cNvPr id="4" name="Group 3"/>
+          <p:cNvGrpSpPr/>
+          <p:nvPr/>
+        </p:nvGrpSpPr>
+        <p:grpSpPr>
+          <a:xfrm>
+            <a:off x="3323898" y="4567926"/>
+            <a:ext cx="5820102" cy="2031325"/>
+            <a:chOff x="2739820" y="5444251"/>
+            <a:chExt cx="5820102" cy="2031325"/>
+          </a:xfrm>
+        </p:grpSpPr>
+        <p:sp>
+          <p:nvSpPr>
+            <p:cNvPr id="5" name="TextBox 4"/>
+            <p:cNvSpPr txBox="1"/>
+            <p:nvPr/>
+          </p:nvSpPr>
+          <p:spPr>
+            <a:xfrm>
+              <a:off x="2739820" y="5444251"/>
+              <a:ext cx="5820102" cy="2031325"/>
+            </a:xfrm>
+            <a:prstGeom prst="rect">
+              <a:avLst/>
+            </a:prstGeom>
+            <a:solidFill>
+              <a:srgbClr val="FF0000"/>
+            </a:solidFill>
+            <a:ln>
+              <a:solidFill>
+                <a:srgbClr val="FF0000"/>
+              </a:solidFill>
+            </a:ln>
+          </p:spPr>
+          <p:txBody>
+            <a:bodyPr wrap="square" rtlCol="0">
+              <a:spAutoFit/>
+            </a:bodyPr>
+            <a:lstStyle/>
+            <a:p>
+              <a:pPr algn="ctr"/>
+              <a:r>
+                <a:rPr lang="en-US" dirty="0" smtClean="0">
+                  <a:solidFill>
+                    <a:schemeClr val="bg1"/>
+                  </a:solidFill>
+                  <a:latin typeface="Arial"/>
+                  <a:cs typeface="Arial"/>
+                </a:rPr>
+                <a:t>Modules</a:t>
+              </a:r>
+            </a:p>
+            <a:p>
+              <a:pPr algn="ctr"/>
+              <a:endParaRPr lang="en-US" dirty="0" smtClean="0">
+                <a:solidFill>
+                  <a:schemeClr val="bg1"/>
+                </a:solidFill>
+                <a:latin typeface="Arial"/>
+                <a:cs typeface="Arial"/>
+              </a:endParaRPr>
+            </a:p>
+            <a:p>
+              <a:pPr algn="ctr"/>
+              <a:r>
+                <a:rPr lang="en-US" dirty="0" smtClean="0">
+                  <a:solidFill>
+                    <a:schemeClr val="bg1"/>
+                  </a:solidFill>
+                  <a:latin typeface="Arial"/>
+                  <a:cs typeface="Arial"/>
+                </a:rPr>
+                <a:t>Diffusion</a:t>
+              </a:r>
+            </a:p>
+            <a:p>
+              <a:pPr algn="ctr"/>
+              <a:endParaRPr lang="en-US" dirty="0" smtClean="0">
+                <a:solidFill>
+                  <a:schemeClr val="bg1"/>
+                </a:solidFill>
+                <a:latin typeface="Arial"/>
+                <a:cs typeface="Arial"/>
+              </a:endParaRPr>
+            </a:p>
+            <a:p>
+              <a:pPr algn="ctr"/>
+              <a:r>
+                <a:rPr lang="en-US" dirty="0" smtClean="0">
+                  <a:solidFill>
+                    <a:schemeClr val="bg1"/>
+                  </a:solidFill>
+                  <a:latin typeface="Arial"/>
+                  <a:cs typeface="Arial"/>
+                </a:rPr>
+                <a:t>Import </a:t>
+              </a:r>
+              <a:r>
+                <a:rPr lang="en-US" dirty="0">
+                  <a:solidFill>
+                    <a:schemeClr val="bg1"/>
+                  </a:solidFill>
+                  <a:latin typeface="Arial"/>
+                  <a:cs typeface="Arial"/>
+                </a:rPr>
+                <a:t>and </a:t>
+              </a:r>
+              <a:r>
+                <a:rPr lang="en-US" dirty="0" smtClean="0">
+                  <a:solidFill>
+                    <a:schemeClr val="bg1"/>
+                  </a:solidFill>
+                  <a:latin typeface="Arial"/>
+                  <a:cs typeface="Arial"/>
+                </a:rPr>
+                <a:t>Export</a:t>
+              </a:r>
+            </a:p>
+            <a:p>
+              <a:pPr algn="ctr"/>
+              <a:endParaRPr lang="en-US" dirty="0" smtClean="0">
+                <a:solidFill>
+                  <a:schemeClr val="bg1"/>
+                </a:solidFill>
+                <a:latin typeface="Arial"/>
+                <a:cs typeface="Arial"/>
+              </a:endParaRPr>
+            </a:p>
+            <a:p>
+              <a:pPr algn="ctr"/>
+              <a:r>
+                <a:rPr lang="en-US" dirty="0" smtClean="0">
+                  <a:solidFill>
+                    <a:schemeClr val="bg1"/>
+                  </a:solidFill>
+                  <a:latin typeface="Arial"/>
+                  <a:cs typeface="Arial"/>
+                </a:rPr>
+                <a:t>Diffusion </a:t>
+              </a:r>
+              <a:r>
+                <a:rPr lang="en-US" dirty="0">
+                  <a:solidFill>
+                    <a:schemeClr val="bg1"/>
+                  </a:solidFill>
+                  <a:latin typeface="Arial"/>
+                  <a:cs typeface="Arial"/>
+                </a:rPr>
+                <a:t>Weighted DICOM Import (</a:t>
+              </a:r>
+              <a:r>
+                <a:rPr lang="en-US" dirty="0" err="1">
+                  <a:solidFill>
+                    <a:schemeClr val="bg1"/>
+                  </a:solidFill>
+                  <a:latin typeface="Arial"/>
+                  <a:cs typeface="Arial"/>
+                </a:rPr>
+                <a:t>DWIConvert</a:t>
+              </a:r>
+              <a:r>
+                <a:rPr lang="en-US" dirty="0">
+                  <a:solidFill>
+                    <a:schemeClr val="bg1"/>
+                  </a:solidFill>
+                  <a:latin typeface="Arial"/>
+                  <a:cs typeface="Arial"/>
+                </a:rPr>
+                <a:t>)</a:t>
+              </a:r>
+            </a:p>
+          </p:txBody>
+        </p:sp>
+        <p:cxnSp>
+          <p:nvCxnSpPr>
+            <p:cNvPr id="19" name="Straight Arrow Connector 18"/>
+            <p:cNvCxnSpPr/>
+            <p:nvPr/>
+          </p:nvCxnSpPr>
+          <p:spPr>
+            <a:xfrm>
+              <a:off x="5644263" y="5773301"/>
+              <a:ext cx="0" cy="293957"/>
+            </a:xfrm>
+            <a:prstGeom prst="straightConnector1">
+              <a:avLst/>
+            </a:prstGeom>
+            <a:ln>
+              <a:solidFill>
+                <a:schemeClr val="bg1"/>
+              </a:solidFill>
+              <a:tailEnd type="arrow"/>
+            </a:ln>
+          </p:spPr>
+          <p:style>
+            <a:lnRef idx="2">
+              <a:schemeClr val="accent1"/>
+            </a:lnRef>
+            <a:fillRef idx="0">
+              <a:schemeClr val="accent1"/>
+            </a:fillRef>
+            <a:effectRef idx="1">
+              <a:schemeClr val="accent1"/>
+            </a:effectRef>
+            <a:fontRef idx="minor">
+              <a:schemeClr val="tx1"/>
+            </a:fontRef>
+          </p:style>
+        </p:cxnSp>
+        <p:cxnSp>
+          <p:nvCxnSpPr>
+            <p:cNvPr id="20" name="Straight Arrow Connector 19"/>
+            <p:cNvCxnSpPr/>
+            <p:nvPr/>
+          </p:nvCxnSpPr>
+          <p:spPr>
+            <a:xfrm>
+              <a:off x="5667315" y="6858000"/>
+              <a:ext cx="0" cy="293957"/>
+            </a:xfrm>
+            <a:prstGeom prst="straightConnector1">
+              <a:avLst/>
+            </a:prstGeom>
+            <a:ln>
+              <a:solidFill>
+                <a:schemeClr val="bg1"/>
+              </a:solidFill>
+              <a:tailEnd type="arrow"/>
+            </a:ln>
+          </p:spPr>
+          <p:style>
+            <a:lnRef idx="2">
+              <a:schemeClr val="accent1"/>
+            </a:lnRef>
+            <a:fillRef idx="0">
+              <a:schemeClr val="accent1"/>
+            </a:fillRef>
+            <a:effectRef idx="1">
+              <a:schemeClr val="accent1"/>
+            </a:effectRef>
+            <a:fontRef idx="minor">
+              <a:schemeClr val="tx1"/>
+            </a:fontRef>
+          </p:style>
+        </p:cxnSp>
+        <p:cxnSp>
+          <p:nvCxnSpPr>
+            <p:cNvPr id="21" name="Straight Arrow Connector 20"/>
+            <p:cNvCxnSpPr/>
+            <p:nvPr/>
+          </p:nvCxnSpPr>
+          <p:spPr>
+            <a:xfrm>
+              <a:off x="5656022" y="6360300"/>
+              <a:ext cx="0" cy="293957"/>
+            </a:xfrm>
+            <a:prstGeom prst="straightConnector1">
+              <a:avLst/>
+            </a:prstGeom>
+            <a:ln>
+              <a:solidFill>
+                <a:schemeClr val="bg1"/>
+              </a:solidFill>
+              <a:tailEnd type="arrow"/>
+            </a:ln>
+          </p:spPr>
+          <p:style>
+            <a:lnRef idx="2">
+              <a:schemeClr val="accent1"/>
+            </a:lnRef>
+            <a:fillRef idx="0">
+              <a:schemeClr val="accent1"/>
+            </a:fillRef>
+            <a:effectRef idx="1">
+              <a:schemeClr val="accent1"/>
+            </a:effectRef>
+            <a:fontRef idx="minor">
+              <a:schemeClr val="tx1"/>
+            </a:fontRef>
+          </p:style>
+        </p:cxnSp>
+      </p:grpSp>
+    </p:spTree>
+    <p:extLst>
+      <p:ext uri="{BB962C8B-B14F-4D97-AF65-F5344CB8AC3E}">
+        <p14:creationId xmlns:p14="http://schemas.microsoft.com/office/powerpoint/2010/main" val="968787571"/>
+      </p:ext>
+    </p:extLst>
+  </p:cSld>
+  <p:clrMapOvr>
+    <a:masterClrMapping/>
+  </p:clrMapOvr>
+  <p:timing>
+    <p:tnLst>
+      <p:par>
+        <p:cTn id="1" dur="indefinite" restart="never" nodeType="tmRoot"/>
+      </p:par>
+    </p:tnLst>
+  </p:timing>
+</p:sld>
+</file>
+
+<file path=ppt/slides/slide4.xml><?xml version="1.0" encoding="utf-8"?>
 <p:sld xmlns:a="http://schemas.openxmlformats.org/drawingml/2006/main" xmlns:r="http://schemas.openxmlformats.org/officeDocument/2006/relationships" xmlns:p="http://schemas.openxmlformats.org/presentationml/2006/main">
   <p:cSld>
     <p:spTree>
@@ -4197,13 +4703,13 @@
         </p:nvPicPr>
         <p:blipFill rotWithShape="1">
           <a:blip r:embed="rId2"/>
-          <a:srcRect t="2542"/>
+          <a:srcRect t="1511"/>
           <a:stretch/>
         </p:blipFill>
         <p:spPr>
           <a:xfrm>
-            <a:off x="0" y="1295208"/>
-            <a:ext cx="9144000" cy="5569742"/>
+            <a:off x="0" y="1787703"/>
+            <a:ext cx="9144000" cy="5065798"/>
           </a:xfrm>
           <a:prstGeom prst="rect">
             <a:avLst/>
@@ -4230,7 +4736,7 @@
                 <a:latin typeface="Arial"/>
                 <a:cs typeface="Arial"/>
               </a:rPr>
-              <a:t>DWI Converter Module</a:t>
+              <a:t>DWI Converter</a:t>
             </a:r>
             <a:endParaRPr lang="en-US" dirty="0">
               <a:latin typeface="Arial"/>
@@ -4247,242 +4753,7 @@
         </p:nvSpPr>
         <p:spPr>
           <a:xfrm>
-            <a:off x="5909841" y="5444251"/>
-            <a:ext cx="2650080" cy="923330"/>
-          </a:xfrm>
-          <a:prstGeom prst="rect">
-            <a:avLst/>
-          </a:prstGeom>
-          <a:solidFill>
-            <a:srgbClr val="FF0000"/>
-          </a:solidFill>
-          <a:ln>
-            <a:solidFill>
-              <a:srgbClr val="FF0000"/>
-            </a:solidFill>
-          </a:ln>
-        </p:spPr>
-        <p:txBody>
-          <a:bodyPr wrap="square" rtlCol="0">
-            <a:spAutoFit/>
-          </a:bodyPr>
-          <a:lstStyle/>
-          <a:p>
-            <a:pPr algn="ctr"/>
-            <a:r>
-              <a:rPr lang="en-US" dirty="0" smtClean="0">
-                <a:solidFill>
-                  <a:schemeClr val="bg1"/>
-                </a:solidFill>
-                <a:latin typeface="Arial"/>
-                <a:cs typeface="Arial"/>
-              </a:rPr>
-              <a:t>Select </a:t>
-            </a:r>
-            <a:r>
-              <a:rPr lang="en-US" dirty="0" smtClean="0">
-                <a:solidFill>
-                  <a:schemeClr val="bg1"/>
-                </a:solidFill>
-                <a:latin typeface="Arial"/>
-                <a:cs typeface="Arial"/>
-              </a:rPr>
-              <a:t>the </a:t>
-            </a:r>
-            <a:r>
-              <a:rPr lang="en-US" b="1" dirty="0" err="1" smtClean="0">
-                <a:solidFill>
-                  <a:schemeClr val="bg1"/>
-                </a:solidFill>
-                <a:latin typeface="Arial"/>
-                <a:cs typeface="Arial"/>
-              </a:rPr>
-              <a:t>DWIConverter</a:t>
-            </a:r>
-            <a:r>
-              <a:rPr lang="en-US" dirty="0" smtClean="0">
-                <a:solidFill>
-                  <a:schemeClr val="bg1"/>
-                </a:solidFill>
-                <a:latin typeface="Arial"/>
-                <a:cs typeface="Arial"/>
-              </a:rPr>
-              <a:t> </a:t>
-            </a:r>
-            <a:r>
-              <a:rPr lang="en-US" dirty="0" smtClean="0">
-                <a:solidFill>
-                  <a:schemeClr val="bg1"/>
-                </a:solidFill>
-                <a:latin typeface="Arial"/>
-                <a:cs typeface="Arial"/>
-              </a:rPr>
-              <a:t>module under </a:t>
-            </a:r>
-            <a:r>
-              <a:rPr lang="en-US" b="1" dirty="0" smtClean="0">
-                <a:solidFill>
-                  <a:schemeClr val="bg1"/>
-                </a:solidFill>
-                <a:latin typeface="Arial"/>
-                <a:cs typeface="Arial"/>
-              </a:rPr>
-              <a:t>Diffusion</a:t>
-            </a:r>
-            <a:r>
-              <a:rPr lang="en-US" dirty="0" smtClean="0">
-                <a:solidFill>
-                  <a:schemeClr val="bg1"/>
-                </a:solidFill>
-                <a:latin typeface="Arial"/>
-                <a:cs typeface="Arial"/>
-              </a:rPr>
-              <a:t> section</a:t>
-            </a:r>
-            <a:endParaRPr lang="en-US" dirty="0">
-              <a:solidFill>
-                <a:schemeClr val="bg1"/>
-              </a:solidFill>
-              <a:latin typeface="Arial"/>
-              <a:cs typeface="Arial"/>
-            </a:endParaRPr>
-          </a:p>
-        </p:txBody>
-      </p:sp>
-      <p:cxnSp>
-        <p:nvCxnSpPr>
-          <p:cNvPr id="7" name="Straight Arrow Connector 6"/>
-          <p:cNvCxnSpPr/>
-          <p:nvPr/>
-        </p:nvCxnSpPr>
-        <p:spPr>
-          <a:xfrm flipH="1" flipV="1">
-            <a:off x="5255429" y="4923910"/>
-            <a:ext cx="654066" cy="520993"/>
-          </a:xfrm>
-          <a:prstGeom prst="straightConnector1">
-            <a:avLst/>
-          </a:prstGeom>
-          <a:ln>
-            <a:solidFill>
-              <a:srgbClr val="FF0000"/>
-            </a:solidFill>
-            <a:tailEnd type="arrow"/>
-          </a:ln>
-        </p:spPr>
-        <p:style>
-          <a:lnRef idx="2">
-            <a:schemeClr val="accent1"/>
-          </a:lnRef>
-          <a:fillRef idx="0">
-            <a:schemeClr val="accent1"/>
-          </a:fillRef>
-          <a:effectRef idx="1">
-            <a:schemeClr val="accent1"/>
-          </a:effectRef>
-          <a:fontRef idx="minor">
-            <a:schemeClr val="tx1"/>
-          </a:fontRef>
-        </p:style>
-      </p:cxnSp>
-    </p:spTree>
-    <p:extLst>
-      <p:ext uri="{BB962C8B-B14F-4D97-AF65-F5344CB8AC3E}">
-        <p14:creationId xmlns:p14="http://schemas.microsoft.com/office/powerpoint/2010/main" val="968787571"/>
-      </p:ext>
-    </p:extLst>
-  </p:cSld>
-  <p:clrMapOvr>
-    <a:masterClrMapping/>
-  </p:clrMapOvr>
-  <p:timing>
-    <p:tnLst>
-      <p:par>
-        <p:cTn xmlns:p14="http://schemas.microsoft.com/office/powerpoint/2010/main" id="1" dur="indefinite" restart="never" nodeType="tmRoot"/>
-      </p:par>
-    </p:tnLst>
-  </p:timing>
-</p:sld>
-</file>
-
-<file path=ppt/slides/slide4.xml><?xml version="1.0" encoding="utf-8"?>
-<p:sld xmlns:a="http://schemas.openxmlformats.org/drawingml/2006/main" xmlns:r="http://schemas.openxmlformats.org/officeDocument/2006/relationships" xmlns:p="http://schemas.openxmlformats.org/presentationml/2006/main">
-  <p:cSld>
-    <p:spTree>
-      <p:nvGrpSpPr>
-        <p:cNvPr id="1" name=""/>
-        <p:cNvGrpSpPr/>
-        <p:nvPr/>
-      </p:nvGrpSpPr>
-      <p:grpSpPr>
-        <a:xfrm>
-          <a:off x="0" y="0"/>
-          <a:ext cx="0" cy="0"/>
-          <a:chOff x="0" y="0"/>
-          <a:chExt cx="0" cy="0"/>
-        </a:xfrm>
-      </p:grpSpPr>
-      <p:pic>
-        <p:nvPicPr>
-          <p:cNvPr id="7" name="Picture 6"/>
-          <p:cNvPicPr>
-            <a:picLocks noChangeAspect="1"/>
-          </p:cNvPicPr>
-          <p:nvPr/>
-        </p:nvPicPr>
-        <p:blipFill rotWithShape="1">
-          <a:blip r:embed="rId2"/>
-          <a:srcRect t="2321"/>
-          <a:stretch/>
-        </p:blipFill>
-        <p:spPr>
-          <a:xfrm>
-            <a:off x="0" y="1282640"/>
-            <a:ext cx="9144000" cy="5582309"/>
-          </a:xfrm>
-          <a:prstGeom prst="rect">
-            <a:avLst/>
-          </a:prstGeom>
-        </p:spPr>
-      </p:pic>
-      <p:sp>
-        <p:nvSpPr>
-          <p:cNvPr id="2" name="Title 1"/>
-          <p:cNvSpPr>
-            <a:spLocks noGrp="1"/>
-          </p:cNvSpPr>
-          <p:nvPr>
-            <p:ph type="title"/>
-          </p:nvPr>
-        </p:nvSpPr>
-        <p:spPr/>
-        <p:txBody>
-          <a:bodyPr/>
-          <a:lstStyle/>
-          <a:p>
-            <a:r>
-              <a:rPr lang="en-US" dirty="0" smtClean="0">
-                <a:latin typeface="Arial"/>
-                <a:cs typeface="Arial"/>
-              </a:rPr>
-              <a:t>DWI Converter</a:t>
-            </a:r>
-            <a:endParaRPr lang="en-US" dirty="0">
-              <a:latin typeface="Arial"/>
-              <a:cs typeface="Arial"/>
-            </a:endParaRPr>
-          </a:p>
-        </p:txBody>
-      </p:sp>
-      <p:sp>
-        <p:nvSpPr>
-          <p:cNvPr id="5" name="TextBox 4"/>
-          <p:cNvSpPr txBox="1"/>
-          <p:nvPr/>
-        </p:nvSpPr>
-        <p:spPr>
-          <a:xfrm>
-            <a:off x="3675919" y="4444802"/>
+            <a:off x="3261741" y="4229045"/>
             <a:ext cx="5373435" cy="1754327"/>
           </a:xfrm>
           <a:prstGeom prst="rect">
@@ -4520,49 +4791,6 @@
               <a:buChar char="•"/>
             </a:pPr>
             <a:r>
-              <a:rPr lang="en-US" b="1" dirty="0" err="1" smtClean="0">
-                <a:solidFill>
-                  <a:srgbClr val="FFFFFF"/>
-                </a:solidFill>
-                <a:latin typeface="Arial"/>
-                <a:cs typeface="Arial"/>
-              </a:rPr>
-              <a:t>Dicom</a:t>
-            </a:r>
-            <a:r>
-              <a:rPr lang="en-US" b="1" dirty="0" smtClean="0">
-                <a:solidFill>
-                  <a:srgbClr val="FFFFFF"/>
-                </a:solidFill>
-                <a:latin typeface="Arial"/>
-                <a:cs typeface="Arial"/>
-              </a:rPr>
-              <a:t> to </a:t>
-            </a:r>
-            <a:r>
-              <a:rPr lang="en-US" b="1" dirty="0" err="1" smtClean="0">
-                <a:solidFill>
-                  <a:srgbClr val="FFFFFF"/>
-                </a:solidFill>
-                <a:latin typeface="Arial"/>
-                <a:cs typeface="Arial"/>
-              </a:rPr>
-              <a:t>Nrrd</a:t>
-            </a:r>
-            <a:endParaRPr lang="en-US" b="1" dirty="0" smtClean="0">
-              <a:solidFill>
-                <a:srgbClr val="FFFFFF"/>
-              </a:solidFill>
-              <a:latin typeface="Arial"/>
-              <a:cs typeface="Arial"/>
-            </a:endParaRPr>
-          </a:p>
-          <a:p>
-            <a:pPr marL="285750" indent="-285750">
-              <a:buFont typeface="Arial"/>
-              <a:buChar char="•"/>
-            </a:pPr>
-            <a:r>
               <a:rPr lang="en-US" dirty="0" err="1" smtClean="0">
                 <a:solidFill>
                   <a:srgbClr val="FFFFFF"/>
@@ -4580,14 +4808,8 @@
                 <a:latin typeface="Arial"/>
                 <a:cs typeface="Arial"/>
               </a:rPr>
-              <a:t> to FSL</a:t>
-            </a:r>
-          </a:p>
-          <a:p>
-            <a:pPr marL="285750" indent="-285750">
-              <a:buFont typeface="Arial"/>
-              <a:buChar char="•"/>
-            </a:pPr>
+              <a:t> to </a:t>
+            </a:r>
             <a:r>
               <a:rPr lang="en-US" dirty="0" err="1" smtClean="0">
                 <a:solidFill>
@@ -4598,6 +4820,29 @@
               </a:rPr>
               <a:t>Nrrd</a:t>
             </a:r>
+            <a:endParaRPr lang="en-US" dirty="0" smtClean="0">
+              <a:solidFill>
+                <a:srgbClr val="FFFFFF"/>
+              </a:solidFill>
+              <a:latin typeface="Arial"/>
+              <a:cs typeface="Arial"/>
+            </a:endParaRPr>
+          </a:p>
+          <a:p>
+            <a:pPr marL="285750" indent="-285750">
+              <a:buFont typeface="Arial"/>
+              <a:buChar char="•"/>
+            </a:pPr>
+            <a:r>
+              <a:rPr lang="en-US" dirty="0" err="1" smtClean="0">
+                <a:solidFill>
+                  <a:srgbClr val="FFFFFF"/>
+                </a:solidFill>
+                <a:latin typeface="Arial"/>
+                <a:cs typeface="Arial"/>
+              </a:rPr>
+              <a:t>Dicom</a:t>
+            </a:r>
             <a:r>
               <a:rPr lang="en-US" dirty="0" smtClean="0">
                 <a:solidFill>
@@ -4615,6 +4860,32 @@
               <a:buChar char="•"/>
             </a:pPr>
             <a:r>
+              <a:rPr lang="en-US" dirty="0" err="1" smtClean="0">
+                <a:solidFill>
+                  <a:srgbClr val="FFFFFF"/>
+                </a:solidFill>
+                <a:latin typeface="Arial"/>
+                <a:cs typeface="Arial"/>
+              </a:rPr>
+              <a:t>Nrrd</a:t>
+            </a:r>
+            <a:r>
+              <a:rPr lang="en-US" dirty="0" smtClean="0">
+                <a:solidFill>
+                  <a:srgbClr val="FFFFFF"/>
+                </a:solidFill>
+                <a:latin typeface="Arial"/>
+                <a:cs typeface="Arial"/>
+              </a:rPr>
+              <a:t> to FSL</a:t>
+            </a:r>
+          </a:p>
+          <a:p>
+            <a:pPr marL="285750" indent="-285750">
+              <a:buFont typeface="Arial"/>
+              <a:buChar char="•"/>
+            </a:pPr>
+            <a:r>
               <a:rPr lang="en-US" dirty="0" smtClean="0">
                 <a:solidFill>
                   <a:srgbClr val="FFFFFF"/>
@@ -4659,8 +4930,8 @@
         </p:nvSpPr>
         <p:spPr>
           <a:xfrm>
-            <a:off x="1010429" y="3013390"/>
-            <a:ext cx="2862176" cy="268642"/>
+            <a:off x="712481" y="2777087"/>
+            <a:ext cx="2308121" cy="212692"/>
           </a:xfrm>
           <a:prstGeom prst="rect">
             <a:avLst/>
@@ -4703,7 +4974,7 @@
         </p:nvCxnSpPr>
         <p:spPr>
           <a:xfrm flipH="1" flipV="1">
-            <a:off x="3193642" y="3282032"/>
+            <a:off x="2779463" y="3066275"/>
             <a:ext cx="482278" cy="1162770"/>
           </a:xfrm>
           <a:prstGeom prst="straightConnector1">
@@ -4744,7 +5015,7 @@
   <p:timing>
     <p:tnLst>
       <p:par>
-        <p:cTn xmlns:p14="http://schemas.microsoft.com/office/powerpoint/2010/main" id="1" dur="indefinite" restart="never" nodeType="tmRoot"/>
+        <p:cTn id="1" dur="indefinite" restart="never" nodeType="tmRoot"/>
       </p:par>
     </p:tnLst>
   </p:timing>
@@ -4770,39 +5041,28 @@
       </p:grpSpPr>
       <p:pic>
         <p:nvPicPr>
-          <p:cNvPr id="3" name="Picture 2"/>
+          <p:cNvPr id="4" name="Picture 3"/>
           <p:cNvPicPr>
             <a:picLocks noChangeAspect="1"/>
           </p:cNvPicPr>
           <p:nvPr/>
         </p:nvPicPr>
         <p:blipFill rotWithShape="1">
-          <a:blip r:embed="rId2">
-            <a:alphaModFix/>
-          </a:blip>
-          <a:srcRect t="24101" r="55540" b="47169"/>
+          <a:blip r:embed="rId2"/>
+          <a:srcRect l="1" t="14889" r="66832" b="62941"/>
           <a:stretch/>
         </p:blipFill>
         <p:spPr>
           <a:xfrm>
-            <a:off x="281891" y="2564208"/>
-            <a:ext cx="8280298" cy="3344247"/>
+            <a:off x="374356" y="2719168"/>
+            <a:ext cx="8388843" cy="3154125"/>
           </a:xfrm>
           <a:prstGeom prst="rect">
             <a:avLst/>
           </a:prstGeom>
-          <a:ln w="38100" cap="sq" cmpd="sng">
-            <a:solidFill>
-              <a:srgbClr val="000000"/>
-            </a:solidFill>
-            <a:prstDash val="solid"/>
-            <a:miter lim="800000"/>
+          <a:ln w="38100">
+            <a:noFill/>
           </a:ln>
-          <a:effectLst>
-            <a:innerShdw blurRad="76200">
-              <a:srgbClr val="000000"/>
-            </a:innerShdw>
-          </a:effectLst>
         </p:spPr>
       </p:pic>
       <p:sp>
@@ -4842,7 +5102,7 @@
         </p:nvSpPr>
         <p:spPr>
           <a:xfrm>
-            <a:off x="2406538" y="4982449"/>
+            <a:off x="2427086" y="5085189"/>
             <a:ext cx="3980746" cy="600777"/>
           </a:xfrm>
           <a:prstGeom prst="rect">
@@ -4886,7 +5146,7 @@
         </p:nvSpPr>
         <p:spPr>
           <a:xfrm>
-            <a:off x="2481976" y="3675145"/>
+            <a:off x="2430606" y="3675145"/>
             <a:ext cx="1415776" cy="359987"/>
           </a:xfrm>
           <a:prstGeom prst="rect">
@@ -4930,8 +5190,8 @@
         </p:nvSpPr>
         <p:spPr>
           <a:xfrm>
-            <a:off x="281892" y="4376042"/>
-            <a:ext cx="2069332" cy="355116"/>
+            <a:off x="374356" y="4505660"/>
+            <a:ext cx="1997416" cy="328237"/>
           </a:xfrm>
           <a:prstGeom prst="rect">
             <a:avLst/>
@@ -4974,7 +5234,7 @@
         </p:nvSpPr>
         <p:spPr>
           <a:xfrm>
-            <a:off x="4147004" y="2075505"/>
+            <a:off x="4095634" y="2075505"/>
             <a:ext cx="3417447" cy="369332"/>
           </a:xfrm>
           <a:prstGeom prst="rect">
@@ -5044,7 +5304,7 @@
         </p:nvCxnSpPr>
         <p:spPr>
           <a:xfrm flipH="1">
-            <a:off x="3673444" y="2444837"/>
+            <a:off x="3622074" y="2444837"/>
             <a:ext cx="473560" cy="1230308"/>
           </a:xfrm>
           <a:prstGeom prst="straightConnector1">
@@ -5080,7 +5340,7 @@
         </p:nvSpPr>
         <p:spPr>
           <a:xfrm>
-            <a:off x="872822" y="6098790"/>
+            <a:off x="893370" y="6201530"/>
             <a:ext cx="4213300" cy="369332"/>
           </a:xfrm>
           <a:prstGeom prst="rect">
@@ -5150,7 +5410,7 @@
         </p:nvCxnSpPr>
         <p:spPr>
           <a:xfrm flipV="1">
-            <a:off x="1585131" y="4731158"/>
+            <a:off x="1605679" y="4833898"/>
             <a:ext cx="244247" cy="1367632"/>
           </a:xfrm>
           <a:prstGeom prst="straightConnector1">
@@ -5186,7 +5446,7 @@
         </p:nvCxnSpPr>
         <p:spPr>
           <a:xfrm flipV="1">
-            <a:off x="1585131" y="5583226"/>
+            <a:off x="1605679" y="5685966"/>
             <a:ext cx="821407" cy="515564"/>
           </a:xfrm>
           <a:prstGeom prst="straightConnector1">
@@ -5227,7 +5487,7 @@
   <p:timing>
     <p:tnLst>
       <p:par>
-        <p:cTn xmlns:p14="http://schemas.microsoft.com/office/powerpoint/2010/main" id="1" dur="indefinite" restart="never" nodeType="tmRoot"/>
+        <p:cTn id="1" dur="indefinite" restart="never" nodeType="tmRoot"/>
       </p:par>
     </p:tnLst>
   </p:timing>
@@ -5253,7 +5513,7 @@
       </p:grpSpPr>
       <p:pic>
         <p:nvPicPr>
-          <p:cNvPr id="3" name="Picture 2"/>
+          <p:cNvPr id="5" name="Picture 4"/>
           <p:cNvPicPr>
             <a:picLocks noChangeAspect="1"/>
           </p:cNvPicPr>
@@ -5261,29 +5521,20 @@
         </p:nvPicPr>
         <p:blipFill rotWithShape="1">
           <a:blip r:embed="rId2"/>
-          <a:srcRect t="23606" r="55449" b="49712"/>
+          <a:srcRect t="15293" r="67079" b="65131"/>
           <a:stretch/>
         </p:blipFill>
         <p:spPr>
           <a:xfrm>
-            <a:off x="421013" y="2838285"/>
-            <a:ext cx="8521700" cy="3189849"/>
+            <a:off x="287836" y="3028853"/>
+            <a:ext cx="8622833" cy="2884092"/>
           </a:xfrm>
           <a:prstGeom prst="rect">
             <a:avLst/>
           </a:prstGeom>
-          <a:ln w="38100" cap="sq" cmpd="sng">
-            <a:solidFill>
-              <a:srgbClr val="000000"/>
-            </a:solidFill>
-            <a:prstDash val="solid"/>
-            <a:miter lim="800000"/>
+          <a:ln w="38100">
+            <a:noFill/>
           </a:ln>
-          <a:effectLst>
-            <a:innerShdw blurRad="76200">
-              <a:srgbClr val="000000"/>
-            </a:innerShdw>
-          </a:effectLst>
         </p:spPr>
       </p:pic>
       <p:sp>
@@ -5323,8 +5574,8 @@
         </p:nvSpPr>
         <p:spPr>
           <a:xfrm>
-            <a:off x="2886132" y="1920605"/>
-            <a:ext cx="3224537" cy="646331"/>
+            <a:off x="2752570" y="2023345"/>
+            <a:ext cx="3224537" cy="923330"/>
           </a:xfrm>
           <a:prstGeom prst="rect">
             <a:avLst/>
@@ -5351,7 +5602,15 @@
                   <a:srgbClr val="FFFFFF"/>
                 </a:solidFill>
               </a:rPr>
-              <a:t>T</a:t>
+              <a:t>The Input DWI Volume file selection should be </a:t>
+            </a:r>
+            <a:r>
+              <a:rPr lang="en-US" b="1" dirty="0" smtClean="0">
+                <a:solidFill>
+                  <a:srgbClr val="FFFFFF"/>
+                </a:solidFill>
+              </a:rPr>
+              <a:t>None</a:t>
             </a:r>
             <a:r>
               <a:rPr lang="en-US" dirty="0" smtClean="0">
@@ -5359,45 +5618,16 @@
                   <a:srgbClr val="FFFFFF"/>
                 </a:solidFill>
               </a:rPr>
-              <a:t>his box should remain empty for </a:t>
-            </a:r>
-            <a:r>
-              <a:rPr lang="en-US" dirty="0" err="1" smtClean="0">
+              <a:t> </a:t>
+            </a:r>
+            <a:r>
+              <a:rPr lang="en-US" dirty="0">
                 <a:solidFill>
                   <a:srgbClr val="FFFFFF"/>
                 </a:solidFill>
               </a:rPr>
-              <a:t>Dicom</a:t>
-            </a:r>
-            <a:r>
-              <a:rPr lang="en-US" dirty="0" smtClean="0">
-                <a:solidFill>
-                  <a:srgbClr val="FFFFFF"/>
-                </a:solidFill>
-              </a:rPr>
-              <a:t> to </a:t>
-            </a:r>
-            <a:r>
-              <a:rPr lang="en-US" dirty="0" err="1" smtClean="0">
-                <a:solidFill>
-                  <a:srgbClr val="FFFFFF"/>
-                </a:solidFill>
-              </a:rPr>
-              <a:t>Nrrd</a:t>
-            </a:r>
-            <a:r>
-              <a:rPr lang="en-US" dirty="0" smtClean="0">
-                <a:solidFill>
-                  <a:srgbClr val="FFFFFF"/>
-                </a:solidFill>
-              </a:rPr>
-              <a:t> conversion</a:t>
-            </a:r>
-            <a:endParaRPr lang="en-US" dirty="0">
-              <a:solidFill>
-                <a:srgbClr val="FFFFFF"/>
-              </a:solidFill>
-            </a:endParaRPr>
+              <a:t>as it not used for this  operation</a:t>
+            </a:r>
           </a:p>
         </p:txBody>
       </p:sp>
@@ -5409,7 +5639,7 @@
         </p:nvSpPr>
         <p:spPr>
           <a:xfrm>
-            <a:off x="457200" y="4420380"/>
+            <a:off x="292816" y="4533394"/>
             <a:ext cx="1969465" cy="359987"/>
           </a:xfrm>
           <a:prstGeom prst="rect">
@@ -5453,8 +5683,8 @@
         </p:nvSpPr>
         <p:spPr>
           <a:xfrm>
-            <a:off x="457200" y="5531581"/>
-            <a:ext cx="7383131" cy="403741"/>
+            <a:off x="292816" y="5599010"/>
+            <a:ext cx="7383131" cy="336312"/>
           </a:xfrm>
           <a:prstGeom prst="rect">
             <a:avLst/>
@@ -5497,7 +5727,7 @@
         </p:nvSpPr>
         <p:spPr>
           <a:xfrm>
-            <a:off x="4498401" y="4099396"/>
+            <a:off x="4334017" y="4099396"/>
             <a:ext cx="4480499" cy="923330"/>
           </a:xfrm>
           <a:prstGeom prst="rect">
@@ -5527,10 +5757,20 @@
                 <a:latin typeface="Arial"/>
                 <a:cs typeface="Arial"/>
               </a:rPr>
-              <a:t>Select the directory of your </a:t>
-            </a:r>
-            <a:r>
-              <a:rPr lang="en-US" dirty="0" err="1" smtClean="0">
+              <a:t>In </a:t>
+            </a:r>
+            <a:r>
+              <a:rPr lang="en-US" dirty="0">
+                <a:solidFill>
+                  <a:srgbClr val="FFFFFF"/>
+                </a:solidFill>
+                <a:latin typeface="Arial"/>
+                <a:cs typeface="Arial"/>
+              </a:rPr>
+              <a:t>your file archive select the directory that only contains the DWI </a:t>
+            </a:r>
+            <a:r>
+              <a:rPr lang="en-US" dirty="0" err="1">
                 <a:solidFill>
                   <a:srgbClr val="FFFFFF"/>
                 </a:solidFill>
@@ -5540,55 +5780,15 @@
               <a:t>Dicom</a:t>
             </a:r>
             <a:r>
-              <a:rPr lang="en-US" dirty="0" smtClean="0">
+              <a:rPr lang="en-US" dirty="0">
                 <a:solidFill>
                   <a:srgbClr val="FFFFFF"/>
                 </a:solidFill>
                 <a:latin typeface="Arial"/>
                 <a:cs typeface="Arial"/>
               </a:rPr>
-              <a:t> data</a:t>
-            </a:r>
-          </a:p>
-          <a:p>
-            <a:pPr algn="ctr"/>
-            <a:r>
-              <a:rPr lang="en-US" dirty="0" smtClean="0">
-                <a:solidFill>
-                  <a:srgbClr val="FFFFFF"/>
-                </a:solidFill>
-                <a:latin typeface="Arial"/>
-                <a:cs typeface="Arial"/>
-              </a:rPr>
-              <a:t>(the directory that you select should only contain DWI </a:t>
-            </a:r>
-            <a:r>
-              <a:rPr lang="en-US" dirty="0" err="1" smtClean="0">
-                <a:solidFill>
-                  <a:srgbClr val="FFFFFF"/>
-                </a:solidFill>
-                <a:latin typeface="Arial"/>
-                <a:cs typeface="Arial"/>
-              </a:rPr>
-              <a:t>Dicom</a:t>
-            </a:r>
-            <a:r>
-              <a:rPr lang="en-US" dirty="0" smtClean="0">
-                <a:solidFill>
-                  <a:srgbClr val="FFFFFF"/>
-                </a:solidFill>
-                <a:latin typeface="Arial"/>
-                <a:cs typeface="Arial"/>
-              </a:rPr>
-              <a:t> files)</a:t>
-            </a:r>
-            <a:endParaRPr lang="en-US" dirty="0">
-              <a:solidFill>
-                <a:srgbClr val="FFFFFF"/>
-              </a:solidFill>
-              <a:latin typeface="Arial"/>
-              <a:cs typeface="Arial"/>
-            </a:endParaRPr>
+              <a:t> files that you want to convert</a:t>
+            </a:r>
           </a:p>
         </p:txBody>
       </p:sp>
@@ -5600,7 +5800,7 @@
         </p:nvCxnSpPr>
         <p:spPr>
           <a:xfrm flipH="1">
-            <a:off x="7840332" y="5022726"/>
+            <a:off x="7675948" y="5022726"/>
             <a:ext cx="697002" cy="648524"/>
           </a:xfrm>
           <a:prstGeom prst="straightConnector1">
@@ -5631,15 +5831,13 @@
       <p:cxnSp>
         <p:nvCxnSpPr>
           <p:cNvPr id="14" name="Straight Arrow Connector 13"/>
-          <p:cNvCxnSpPr>
-            <a:stCxn id="6" idx="2"/>
-          </p:cNvCxnSpPr>
+          <p:cNvCxnSpPr/>
           <p:nvPr/>
         </p:nvCxnSpPr>
         <p:spPr>
           <a:xfrm flipH="1">
-            <a:off x="2426665" y="2566936"/>
-            <a:ext cx="2071736" cy="1853444"/>
+            <a:off x="2262280" y="2910964"/>
+            <a:ext cx="2071736" cy="1576445"/>
           </a:xfrm>
           <a:prstGeom prst="straightConnector1">
             <a:avLst/>
@@ -5674,8 +5872,8 @@
         </p:nvCxnSpPr>
         <p:spPr>
           <a:xfrm>
-            <a:off x="1648244" y="4780367"/>
-            <a:ext cx="778421" cy="458656"/>
+            <a:off x="1277548" y="4893381"/>
+            <a:ext cx="864382" cy="305343"/>
           </a:xfrm>
           <a:prstGeom prst="straightConnector1">
             <a:avLst/>
@@ -5715,7 +5913,7 @@
   <p:timing>
     <p:tnLst>
       <p:par>
-        <p:cTn xmlns:p14="http://schemas.microsoft.com/office/powerpoint/2010/main" id="1" dur="indefinite" restart="never" nodeType="tmRoot"/>
+        <p:cTn id="1" dur="indefinite" restart="never" nodeType="tmRoot"/>
       </p:par>
     </p:tnLst>
   </p:timing>
@@ -5741,37 +5939,52 @@
       </p:grpSpPr>
       <p:pic>
         <p:nvPicPr>
-          <p:cNvPr id="5" name="Picture 4"/>
+          <p:cNvPr id="7" name="Picture 6"/>
+          <p:cNvPicPr>
+            <a:picLocks noChangeAspect="1"/>
+          </p:cNvPicPr>
+          <p:nvPr/>
+        </p:nvPicPr>
+        <p:blipFill>
+          <a:blip r:embed="rId2"/>
+          <a:stretch>
+            <a:fillRect/>
+          </a:stretch>
+        </p:blipFill>
+        <p:spPr>
+          <a:xfrm>
+            <a:off x="12928" y="5119322"/>
+            <a:ext cx="9144000" cy="667760"/>
+          </a:xfrm>
+          <a:prstGeom prst="rect">
+            <a:avLst/>
+          </a:prstGeom>
+        </p:spPr>
+      </p:pic>
+      <p:pic>
+        <p:nvPicPr>
+          <p:cNvPr id="3" name="Picture 2"/>
           <p:cNvPicPr>
             <a:picLocks noChangeAspect="1"/>
           </p:cNvPicPr>
           <p:nvPr/>
         </p:nvPicPr>
         <p:blipFill rotWithShape="1">
-          <a:blip r:embed="rId2"/>
-          <a:srcRect t="53809" r="55586" b="18907"/>
+          <a:blip r:embed="rId3"/>
+          <a:srcRect b="61059"/>
           <a:stretch/>
         </p:blipFill>
         <p:spPr>
           <a:xfrm>
-            <a:off x="95552" y="2222491"/>
-            <a:ext cx="8978752" cy="3447345"/>
+            <a:off x="12928" y="2442579"/>
+            <a:ext cx="9144000" cy="2559564"/>
           </a:xfrm>
           <a:prstGeom prst="rect">
             <a:avLst/>
           </a:prstGeom>
-          <a:ln w="38100" cap="sq" cmpd="sng">
-            <a:solidFill>
-              <a:srgbClr val="000000"/>
-            </a:solidFill>
-            <a:prstDash val="solid"/>
-            <a:miter lim="800000"/>
+          <a:ln w="38100">
+            <a:noFill/>
           </a:ln>
-          <a:effectLst>
-            <a:innerShdw blurRad="76200">
-              <a:srgbClr val="000000"/>
-            </a:innerShdw>
-          </a:effectLst>
         </p:spPr>
       </p:pic>
       <p:sp>
@@ -5811,7 +6024,7 @@
         </p:nvSpPr>
         <p:spPr>
           <a:xfrm>
-            <a:off x="4702448" y="1638331"/>
+            <a:off x="4455870" y="1843811"/>
             <a:ext cx="3269083" cy="646331"/>
           </a:xfrm>
           <a:prstGeom prst="rect">
@@ -5863,7 +6076,7 @@
         </p:nvCxnSpPr>
         <p:spPr>
           <a:xfrm flipH="1">
-            <a:off x="3528025" y="1961497"/>
+            <a:off x="3281447" y="2166977"/>
             <a:ext cx="1174423" cy="1296734"/>
           </a:xfrm>
           <a:prstGeom prst="straightConnector1">
@@ -5899,7 +6112,7 @@
         </p:nvSpPr>
         <p:spPr>
           <a:xfrm>
-            <a:off x="1123589" y="5995215"/>
+            <a:off x="1370169" y="6027084"/>
             <a:ext cx="4245248" cy="646331"/>
           </a:xfrm>
           <a:prstGeom prst="rect">
@@ -6018,9 +6231,9 @@
           <p:nvPr/>
         </p:nvCxnSpPr>
         <p:spPr>
-          <a:xfrm flipV="1">
-            <a:off x="5811620" y="3732856"/>
-            <a:ext cx="0" cy="727607"/>
+          <a:xfrm flipH="1" flipV="1">
+            <a:off x="5794625" y="3883631"/>
+            <a:ext cx="16995" cy="576833"/>
           </a:xfrm>
           <a:prstGeom prst="straightConnector1">
             <a:avLst/>
@@ -6055,7 +6268,7 @@
         </p:nvCxnSpPr>
         <p:spPr>
           <a:xfrm flipV="1">
-            <a:off x="5368837" y="5541559"/>
+            <a:off x="5615417" y="5644073"/>
             <a:ext cx="2726377" cy="469212"/>
           </a:xfrm>
           <a:prstGeom prst="straightConnector1">
@@ -6096,7 +6309,7 @@
   <p:timing>
     <p:tnLst>
       <p:par>
-        <p:cTn xmlns:p14="http://schemas.microsoft.com/office/powerpoint/2010/main" id="1" dur="indefinite" restart="never" nodeType="tmRoot"/>
+        <p:cTn id="1" dur="indefinite" restart="never" nodeType="tmRoot"/>
       </p:par>
     </p:tnLst>
   </p:timing>
@@ -6289,7 +6502,7 @@
   <p:timing>
     <p:tnLst>
       <p:par>
-        <p:cTn xmlns:p14="http://schemas.microsoft.com/office/powerpoint/2010/main" id="1" dur="indefinite" restart="never" nodeType="tmRoot"/>
+        <p:cTn id="1" dur="indefinite" restart="never" nodeType="tmRoot"/>
       </p:par>
     </p:tnLst>
   </p:timing>
@@ -6490,7 +6703,7 @@
   <p:timing>
     <p:tnLst>
       <p:par>
-        <p:cTn xmlns:p14="http://schemas.microsoft.com/office/powerpoint/2010/main" id="1" dur="indefinite" restart="never" nodeType="tmRoot"/>
+        <p:cTn id="1" dur="indefinite" restart="never" nodeType="tmRoot"/>
       </p:par>
     </p:tnLst>
   </p:timing>

</xml_diff>